<commit_message>
finition ppt + code fonctionnel
</commit_message>
<xml_diff>
--- a/Python for data analysis Project.pptx
+++ b/Python for data analysis Project.pptx
@@ -7,6 +7,11 @@
   <p:sldIdLst>
     <p:sldId id="256" r:id="rId2"/>
     <p:sldId id="257" r:id="rId3"/>
+    <p:sldId id="259" r:id="rId4"/>
+    <p:sldId id="258" r:id="rId5"/>
+    <p:sldId id="260" r:id="rId6"/>
+    <p:sldId id="261" r:id="rId7"/>
+    <p:sldId id="262" r:id="rId8"/>
   </p:sldIdLst>
   <p:sldSz cx="12192000" cy="6858000"/>
   <p:notesSz cx="6858000" cy="9144000"/>
@@ -5373,22 +5378,55 @@
           <a:lstStyle/>
           <a:p>
             <a:r>
-              <a:rPr lang="fr-FR" dirty="0"/>
+              <a:rPr lang="fr-FR" dirty="0">
+                <a:solidFill>
+                  <a:schemeClr val="bg2">
+                    <a:lumMod val="20000"/>
+                    <a:lumOff val="80000"/>
+                  </a:schemeClr>
+                </a:solidFill>
+              </a:rPr>
               <a:t>Image Segmentation Data Set</a:t>
             </a:r>
           </a:p>
           <a:p>
             <a:r>
               <a:rPr lang="fr-FR" dirty="0">
-                <a:hlinkClick r:id="rId2"/>
+                <a:solidFill>
+                  <a:schemeClr val="bg2">
+                    <a:lumMod val="20000"/>
+                    <a:lumOff val="80000"/>
+                  </a:schemeClr>
+                </a:solidFill>
+                <a:hlinkClick r:id="rId2">
+                  <a:extLst>
+                    <a:ext uri="{A12FA001-AC4F-418D-AE19-62706E023703}">
+                      <ahyp:hlinkClr xmlns:ahyp="http://schemas.microsoft.com/office/drawing/2018/hyperlinkcolor" val="tx"/>
+                    </a:ext>
+                  </a:extLst>
+                </a:hlinkClick>
               </a:rPr>
               <a:t>https://archive.ics.uci.edu/ml/datasets/Image+Segmentation</a:t>
             </a:r>
-            <a:endParaRPr lang="fr-FR" dirty="0"/>
-          </a:p>
-          <a:p>
-            <a:r>
-              <a:rPr lang="fr-FR" dirty="0"/>
+            <a:endParaRPr lang="fr-FR" dirty="0">
+              <a:solidFill>
+                <a:schemeClr val="bg2">
+                  <a:lumMod val="20000"/>
+                  <a:lumOff val="80000"/>
+                </a:schemeClr>
+              </a:solidFill>
+            </a:endParaRPr>
+          </a:p>
+          <a:p>
+            <a:r>
+              <a:rPr lang="fr-FR" dirty="0">
+                <a:solidFill>
+                  <a:schemeClr val="bg2">
+                    <a:lumMod val="20000"/>
+                    <a:lumOff val="80000"/>
+                  </a:schemeClr>
+                </a:solidFill>
+              </a:rPr>
               <a:t>Oussama Ayoub</a:t>
             </a:r>
           </a:p>
@@ -5487,48 +5525,118 @@
           <a:lstStyle/>
           <a:p>
             <a:r>
-              <a:rPr lang="fr-FR" dirty="0"/>
+              <a:rPr lang="fr-FR" dirty="0">
+                <a:solidFill>
+                  <a:schemeClr val="bg2">
+                    <a:lumMod val="20000"/>
+                    <a:lumOff val="80000"/>
+                  </a:schemeClr>
+                </a:solidFill>
+              </a:rPr>
               <a:t>7 images d’environnements extérieurs</a:t>
             </a:r>
           </a:p>
           <a:p>
             <a:r>
-              <a:rPr lang="fr-FR" dirty="0"/>
+              <a:rPr lang="fr-FR" dirty="0">
+                <a:solidFill>
+                  <a:schemeClr val="bg2">
+                    <a:lumMod val="20000"/>
+                    <a:lumOff val="80000"/>
+                  </a:schemeClr>
+                </a:solidFill>
+              </a:rPr>
               <a:t>Chaque image est divisée en plusieurs images 3*3 pixels</a:t>
             </a:r>
           </a:p>
           <a:p>
             <a:r>
-              <a:rPr lang="fr-FR" dirty="0"/>
+              <a:rPr lang="fr-FR" dirty="0">
+                <a:solidFill>
+                  <a:schemeClr val="bg2">
+                    <a:lumMod val="20000"/>
+                    <a:lumOff val="80000"/>
+                  </a:schemeClr>
+                </a:solidFill>
+              </a:rPr>
               <a:t>Chaque sous images est une ligne dans la base et est labélisée en fonction de ce qu’elle représente</a:t>
             </a:r>
           </a:p>
           <a:p>
             <a:r>
-              <a:rPr lang="fr-FR" dirty="0"/>
+              <a:rPr lang="fr-FR" dirty="0">
+                <a:solidFill>
+                  <a:schemeClr val="bg2">
+                    <a:lumMod val="20000"/>
+                    <a:lumOff val="80000"/>
+                  </a:schemeClr>
+                </a:solidFill>
+              </a:rPr>
               <a:t>7 catégories : </a:t>
             </a:r>
             <a:r>
-              <a:rPr lang="fr-FR" dirty="0" err="1"/>
+              <a:rPr lang="fr-FR" dirty="0" err="1">
+                <a:solidFill>
+                  <a:schemeClr val="bg2">
+                    <a:lumMod val="20000"/>
+                    <a:lumOff val="80000"/>
+                  </a:schemeClr>
+                </a:solidFill>
+              </a:rPr>
               <a:t>Brickface</a:t>
             </a:r>
             <a:r>
-              <a:rPr lang="fr-FR" dirty="0"/>
+              <a:rPr lang="fr-FR" dirty="0">
+                <a:solidFill>
+                  <a:schemeClr val="bg2">
+                    <a:lumMod val="20000"/>
+                    <a:lumOff val="80000"/>
+                  </a:schemeClr>
+                </a:solidFill>
+              </a:rPr>
               <a:t>, Cement, </a:t>
             </a:r>
             <a:r>
-              <a:rPr lang="fr-FR" dirty="0" err="1"/>
+              <a:rPr lang="fr-FR" dirty="0" err="1">
+                <a:solidFill>
+                  <a:schemeClr val="bg2">
+                    <a:lumMod val="20000"/>
+                    <a:lumOff val="80000"/>
+                  </a:schemeClr>
+                </a:solidFill>
+              </a:rPr>
               <a:t>Foliage</a:t>
             </a:r>
             <a:r>
-              <a:rPr lang="fr-FR" dirty="0"/>
+              <a:rPr lang="fr-FR" dirty="0">
+                <a:solidFill>
+                  <a:schemeClr val="bg2">
+                    <a:lumMod val="20000"/>
+                    <a:lumOff val="80000"/>
+                  </a:schemeClr>
+                </a:solidFill>
+              </a:rPr>
               <a:t>, Grass, Path, Sky, </a:t>
             </a:r>
             <a:r>
-              <a:rPr lang="fr-FR" dirty="0" err="1"/>
+              <a:rPr lang="fr-FR" dirty="0" err="1">
+                <a:solidFill>
+                  <a:schemeClr val="bg2">
+                    <a:lumMod val="20000"/>
+                    <a:lumOff val="80000"/>
+                  </a:schemeClr>
+                </a:solidFill>
+              </a:rPr>
               <a:t>Window</a:t>
             </a:r>
-            <a:endParaRPr lang="fr-FR" dirty="0"/>
+            <a:endParaRPr lang="fr-FR" dirty="0">
+              <a:solidFill>
+                <a:schemeClr val="bg2">
+                  <a:lumMod val="20000"/>
+                  <a:lumOff val="80000"/>
+                </a:schemeClr>
+              </a:solidFill>
+            </a:endParaRPr>
           </a:p>
         </p:txBody>
       </p:sp>
@@ -5805,6 +5913,1633 @@
     <p:extLst>
       <p:ext uri="{BB962C8B-B14F-4D97-AF65-F5344CB8AC3E}">
         <p14:creationId xmlns:p14="http://schemas.microsoft.com/office/powerpoint/2010/main" val="3500526101"/>
+      </p:ext>
+    </p:extLst>
+  </p:cSld>
+  <p:clrMapOvr>
+    <a:masterClrMapping/>
+  </p:clrMapOvr>
+</p:sld>
+</file>
+
+<file path=ppt/slides/slide3.xml><?xml version="1.0" encoding="utf-8"?>
+<p:sld xmlns:a="http://schemas.openxmlformats.org/drawingml/2006/main" xmlns:r="http://schemas.openxmlformats.org/officeDocument/2006/relationships" xmlns:p="http://schemas.openxmlformats.org/presentationml/2006/main">
+  <p:cSld>
+    <p:spTree>
+      <p:nvGrpSpPr>
+        <p:cNvPr id="1" name=""/>
+        <p:cNvGrpSpPr/>
+        <p:nvPr/>
+      </p:nvGrpSpPr>
+      <p:grpSpPr>
+        <a:xfrm>
+          <a:off x="0" y="0"/>
+          <a:ext cx="0" cy="0"/>
+          <a:chOff x="0" y="0"/>
+          <a:chExt cx="0" cy="0"/>
+        </a:xfrm>
+      </p:grpSpPr>
+      <p:sp>
+        <p:nvSpPr>
+          <p:cNvPr id="2" name="Titre 1">
+            <a:extLst>
+              <a:ext uri="{FF2B5EF4-FFF2-40B4-BE49-F238E27FC236}">
+                <a16:creationId xmlns:a16="http://schemas.microsoft.com/office/drawing/2014/main" id="{152F2687-BDBF-4933-988C-0EEF2F66903B}"/>
+              </a:ext>
+            </a:extLst>
+          </p:cNvPr>
+          <p:cNvSpPr>
+            <a:spLocks noGrp="1"/>
+          </p:cNvSpPr>
+          <p:nvPr>
+            <p:ph type="title"/>
+          </p:nvPr>
+        </p:nvSpPr>
+        <p:spPr>
+          <a:xfrm>
+            <a:off x="684211" y="0"/>
+            <a:ext cx="8534400" cy="1080655"/>
+          </a:xfrm>
+        </p:spPr>
+        <p:txBody>
+          <a:bodyPr/>
+          <a:lstStyle/>
+          <a:p>
+            <a:r>
+              <a:rPr lang="fr-FR" dirty="0"/>
+              <a:t>Les </a:t>
+            </a:r>
+            <a:r>
+              <a:rPr lang="fr-FR" dirty="0" err="1"/>
+              <a:t>features</a:t>
+            </a:r>
+            <a:endParaRPr lang="fr-FR" dirty="0"/>
+          </a:p>
+        </p:txBody>
+      </p:sp>
+      <p:sp>
+        <p:nvSpPr>
+          <p:cNvPr id="3" name="Espace réservé du contenu 2">
+            <a:extLst>
+              <a:ext uri="{FF2B5EF4-FFF2-40B4-BE49-F238E27FC236}">
+                <a16:creationId xmlns:a16="http://schemas.microsoft.com/office/drawing/2014/main" id="{082076C8-BB0B-4194-BE46-20BDCC129AFA}"/>
+              </a:ext>
+            </a:extLst>
+          </p:cNvPr>
+          <p:cNvSpPr>
+            <a:spLocks noGrp="1"/>
+          </p:cNvSpPr>
+          <p:nvPr>
+            <p:ph idx="1"/>
+          </p:nvPr>
+        </p:nvSpPr>
+        <p:spPr>
+          <a:xfrm>
+            <a:off x="684211" y="1080655"/>
+            <a:ext cx="11319367" cy="5675252"/>
+          </a:xfrm>
+        </p:spPr>
+        <p:txBody>
+          <a:bodyPr anchor="t">
+            <a:normAutofit fontScale="32500" lnSpcReduction="20000"/>
+          </a:bodyPr>
+          <a:lstStyle/>
+          <a:p>
+            <a:r>
+              <a:rPr lang="en-GB" sz="3700" dirty="0">
+                <a:solidFill>
+                  <a:schemeClr val="bg2">
+                    <a:lumMod val="20000"/>
+                    <a:lumOff val="80000"/>
+                  </a:schemeClr>
+                </a:solidFill>
+              </a:rPr>
+              <a:t>region-centroid-col:  the column of the </a:t>
+            </a:r>
+            <a:r>
+              <a:rPr lang="en-GB" sz="3700" dirty="0" err="1">
+                <a:solidFill>
+                  <a:schemeClr val="bg2">
+                    <a:lumMod val="20000"/>
+                    <a:lumOff val="80000"/>
+                  </a:schemeClr>
+                </a:solidFill>
+              </a:rPr>
+              <a:t>center</a:t>
+            </a:r>
+            <a:r>
+              <a:rPr lang="en-GB" sz="3700" dirty="0">
+                <a:solidFill>
+                  <a:schemeClr val="bg2">
+                    <a:lumMod val="20000"/>
+                    <a:lumOff val="80000"/>
+                  </a:schemeClr>
+                </a:solidFill>
+              </a:rPr>
+              <a:t> pixel of the region.</a:t>
+            </a:r>
+            <a:endParaRPr lang="fr-FR" sz="3700" dirty="0">
+              <a:solidFill>
+                <a:schemeClr val="bg2">
+                  <a:lumMod val="20000"/>
+                  <a:lumOff val="80000"/>
+                </a:schemeClr>
+              </a:solidFill>
+            </a:endParaRPr>
+          </a:p>
+          <a:p>
+            <a:r>
+              <a:rPr lang="en-GB" sz="3700" dirty="0">
+                <a:solidFill>
+                  <a:schemeClr val="bg2">
+                    <a:lumMod val="20000"/>
+                    <a:lumOff val="80000"/>
+                  </a:schemeClr>
+                </a:solidFill>
+              </a:rPr>
+              <a:t>region-centroid-row:  the row of the </a:t>
+            </a:r>
+            <a:r>
+              <a:rPr lang="en-GB" sz="3700" dirty="0" err="1">
+                <a:solidFill>
+                  <a:schemeClr val="bg2">
+                    <a:lumMod val="20000"/>
+                    <a:lumOff val="80000"/>
+                  </a:schemeClr>
+                </a:solidFill>
+              </a:rPr>
+              <a:t>center</a:t>
+            </a:r>
+            <a:r>
+              <a:rPr lang="en-GB" sz="3700" dirty="0">
+                <a:solidFill>
+                  <a:schemeClr val="bg2">
+                    <a:lumMod val="20000"/>
+                    <a:lumOff val="80000"/>
+                  </a:schemeClr>
+                </a:solidFill>
+              </a:rPr>
+              <a:t> pixel of the region.</a:t>
+            </a:r>
+            <a:endParaRPr lang="fr-FR" sz="3700" dirty="0">
+              <a:solidFill>
+                <a:schemeClr val="bg2">
+                  <a:lumMod val="20000"/>
+                  <a:lumOff val="80000"/>
+                </a:schemeClr>
+              </a:solidFill>
+            </a:endParaRPr>
+          </a:p>
+          <a:p>
+            <a:r>
+              <a:rPr lang="en-GB" sz="3700" dirty="0">
+                <a:solidFill>
+                  <a:schemeClr val="bg2">
+                    <a:lumMod val="20000"/>
+                    <a:lumOff val="80000"/>
+                  </a:schemeClr>
+                </a:solidFill>
+              </a:rPr>
+              <a:t>region-pixel-count:  the number of pixels in a region = 9.</a:t>
+            </a:r>
+            <a:endParaRPr lang="fr-FR" sz="3700" dirty="0">
+              <a:solidFill>
+                <a:schemeClr val="bg2">
+                  <a:lumMod val="20000"/>
+                  <a:lumOff val="80000"/>
+                </a:schemeClr>
+              </a:solidFill>
+            </a:endParaRPr>
+          </a:p>
+          <a:p>
+            <a:r>
+              <a:rPr lang="en-GB" sz="3700" dirty="0">
+                <a:solidFill>
+                  <a:schemeClr val="bg2">
+                    <a:lumMod val="20000"/>
+                    <a:lumOff val="80000"/>
+                  </a:schemeClr>
+                </a:solidFill>
+              </a:rPr>
+              <a:t>short-line-density-5:  the results of a line </a:t>
+            </a:r>
+            <a:r>
+              <a:rPr lang="en-GB" sz="3700" dirty="0" err="1">
+                <a:solidFill>
+                  <a:schemeClr val="bg2">
+                    <a:lumMod val="20000"/>
+                    <a:lumOff val="80000"/>
+                  </a:schemeClr>
+                </a:solidFill>
+              </a:rPr>
+              <a:t>extractoin</a:t>
+            </a:r>
+            <a:r>
+              <a:rPr lang="en-GB" sz="3700" dirty="0">
+                <a:solidFill>
+                  <a:schemeClr val="bg2">
+                    <a:lumMod val="20000"/>
+                    <a:lumOff val="80000"/>
+                  </a:schemeClr>
+                </a:solidFill>
+              </a:rPr>
+              <a:t> algorithm that counts how many lines of length 5 (any orientation) with low contrast, less than or equal to 5, go through the region.</a:t>
+            </a:r>
+            <a:endParaRPr lang="fr-FR" sz="3700" dirty="0">
+              <a:solidFill>
+                <a:schemeClr val="bg2">
+                  <a:lumMod val="20000"/>
+                  <a:lumOff val="80000"/>
+                </a:schemeClr>
+              </a:solidFill>
+            </a:endParaRPr>
+          </a:p>
+          <a:p>
+            <a:r>
+              <a:rPr lang="en-GB" sz="3700" dirty="0">
+                <a:solidFill>
+                  <a:schemeClr val="bg2">
+                    <a:lumMod val="20000"/>
+                    <a:lumOff val="80000"/>
+                  </a:schemeClr>
+                </a:solidFill>
+              </a:rPr>
+              <a:t>short-line-density-2:  same as short-line-density-5 but counts lines of high contrast, greater than 5.</a:t>
+            </a:r>
+            <a:endParaRPr lang="fr-FR" sz="3700" dirty="0">
+              <a:solidFill>
+                <a:schemeClr val="bg2">
+                  <a:lumMod val="20000"/>
+                  <a:lumOff val="80000"/>
+                </a:schemeClr>
+              </a:solidFill>
+            </a:endParaRPr>
+          </a:p>
+          <a:p>
+            <a:r>
+              <a:rPr lang="en-GB" sz="3700" dirty="0" err="1">
+                <a:solidFill>
+                  <a:schemeClr val="bg2">
+                    <a:lumMod val="20000"/>
+                    <a:lumOff val="80000"/>
+                  </a:schemeClr>
+                </a:solidFill>
+              </a:rPr>
+              <a:t>vedge</a:t>
+            </a:r>
+            <a:r>
+              <a:rPr lang="en-GB" sz="3700" dirty="0">
+                <a:solidFill>
+                  <a:schemeClr val="bg2">
+                    <a:lumMod val="20000"/>
+                    <a:lumOff val="80000"/>
+                  </a:schemeClr>
+                </a:solidFill>
+              </a:rPr>
+              <a:t>-mean:  measure the contrast of horizontally adjacent pixels in the region. There are 6, the mean and standard deviation are given.  This attribute is used as a vertical edge detector.</a:t>
+            </a:r>
+            <a:endParaRPr lang="fr-FR" sz="3700" dirty="0">
+              <a:solidFill>
+                <a:schemeClr val="bg2">
+                  <a:lumMod val="20000"/>
+                  <a:lumOff val="80000"/>
+                </a:schemeClr>
+              </a:solidFill>
+            </a:endParaRPr>
+          </a:p>
+          <a:p>
+            <a:r>
+              <a:rPr lang="en-GB" sz="3700" dirty="0" err="1">
+                <a:solidFill>
+                  <a:schemeClr val="bg2">
+                    <a:lumMod val="20000"/>
+                    <a:lumOff val="80000"/>
+                  </a:schemeClr>
+                </a:solidFill>
+              </a:rPr>
+              <a:t>vegde-sd</a:t>
+            </a:r>
+            <a:r>
+              <a:rPr lang="en-GB" sz="3700" dirty="0">
+                <a:solidFill>
+                  <a:schemeClr val="bg2">
+                    <a:lumMod val="20000"/>
+                    <a:lumOff val="80000"/>
+                  </a:schemeClr>
+                </a:solidFill>
+              </a:rPr>
+              <a:t>:  (see 6)</a:t>
+            </a:r>
+            <a:endParaRPr lang="fr-FR" sz="3700" dirty="0">
+              <a:solidFill>
+                <a:schemeClr val="bg2">
+                  <a:lumMod val="20000"/>
+                  <a:lumOff val="80000"/>
+                </a:schemeClr>
+              </a:solidFill>
+            </a:endParaRPr>
+          </a:p>
+          <a:p>
+            <a:r>
+              <a:rPr lang="en-GB" sz="3700" dirty="0">
+                <a:solidFill>
+                  <a:schemeClr val="bg2">
+                    <a:lumMod val="20000"/>
+                    <a:lumOff val="80000"/>
+                  </a:schemeClr>
+                </a:solidFill>
+              </a:rPr>
+              <a:t>hedge-mean:  measures the contrast of vertically adjacent pixels. Used for horizontal line detection. </a:t>
+            </a:r>
+            <a:endParaRPr lang="fr-FR" sz="3700" dirty="0">
+              <a:solidFill>
+                <a:schemeClr val="bg2">
+                  <a:lumMod val="20000"/>
+                  <a:lumOff val="80000"/>
+                </a:schemeClr>
+              </a:solidFill>
+            </a:endParaRPr>
+          </a:p>
+          <a:p>
+            <a:r>
+              <a:rPr lang="en-GB" sz="3700" dirty="0">
+                <a:solidFill>
+                  <a:schemeClr val="bg2">
+                    <a:lumMod val="20000"/>
+                    <a:lumOff val="80000"/>
+                  </a:schemeClr>
+                </a:solidFill>
+              </a:rPr>
+              <a:t>hedge-</a:t>
+            </a:r>
+            <a:r>
+              <a:rPr lang="en-GB" sz="3700" dirty="0" err="1">
+                <a:solidFill>
+                  <a:schemeClr val="bg2">
+                    <a:lumMod val="20000"/>
+                    <a:lumOff val="80000"/>
+                  </a:schemeClr>
+                </a:solidFill>
+              </a:rPr>
+              <a:t>sd</a:t>
+            </a:r>
+            <a:r>
+              <a:rPr lang="en-GB" sz="3700" dirty="0">
+                <a:solidFill>
+                  <a:schemeClr val="bg2">
+                    <a:lumMod val="20000"/>
+                    <a:lumOff val="80000"/>
+                  </a:schemeClr>
+                </a:solidFill>
+              </a:rPr>
+              <a:t>: (see 8).</a:t>
+            </a:r>
+            <a:endParaRPr lang="fr-FR" sz="3700" dirty="0">
+              <a:solidFill>
+                <a:schemeClr val="bg2">
+                  <a:lumMod val="20000"/>
+                  <a:lumOff val="80000"/>
+                </a:schemeClr>
+              </a:solidFill>
+            </a:endParaRPr>
+          </a:p>
+          <a:p>
+            <a:r>
+              <a:rPr lang="en-GB" sz="3700" dirty="0">
+                <a:solidFill>
+                  <a:schemeClr val="bg2">
+                    <a:lumMod val="20000"/>
+                    <a:lumOff val="80000"/>
+                  </a:schemeClr>
+                </a:solidFill>
+              </a:rPr>
+              <a:t>intensity-mean:  the average over the region of (R + G + B)/3</a:t>
+            </a:r>
+            <a:endParaRPr lang="fr-FR" sz="3700" dirty="0">
+              <a:solidFill>
+                <a:schemeClr val="bg2">
+                  <a:lumMod val="20000"/>
+                  <a:lumOff val="80000"/>
+                </a:schemeClr>
+              </a:solidFill>
+            </a:endParaRPr>
+          </a:p>
+          <a:p>
+            <a:r>
+              <a:rPr lang="en-GB" sz="3700" dirty="0" err="1">
+                <a:solidFill>
+                  <a:schemeClr val="bg2">
+                    <a:lumMod val="20000"/>
+                    <a:lumOff val="80000"/>
+                  </a:schemeClr>
+                </a:solidFill>
+              </a:rPr>
+              <a:t>rawred</a:t>
+            </a:r>
+            <a:r>
+              <a:rPr lang="en-GB" sz="3700" dirty="0">
+                <a:solidFill>
+                  <a:schemeClr val="bg2">
+                    <a:lumMod val="20000"/>
+                    <a:lumOff val="80000"/>
+                  </a:schemeClr>
+                </a:solidFill>
+              </a:rPr>
+              <a:t>-mean: the average over the region of the R value.</a:t>
+            </a:r>
+            <a:endParaRPr lang="fr-FR" sz="3700" dirty="0">
+              <a:solidFill>
+                <a:schemeClr val="bg2">
+                  <a:lumMod val="20000"/>
+                  <a:lumOff val="80000"/>
+                </a:schemeClr>
+              </a:solidFill>
+            </a:endParaRPr>
+          </a:p>
+          <a:p>
+            <a:r>
+              <a:rPr lang="en-GB" sz="3700" dirty="0" err="1">
+                <a:solidFill>
+                  <a:schemeClr val="bg2">
+                    <a:lumMod val="20000"/>
+                    <a:lumOff val="80000"/>
+                  </a:schemeClr>
+                </a:solidFill>
+              </a:rPr>
+              <a:t>rawblue</a:t>
+            </a:r>
+            <a:r>
+              <a:rPr lang="en-GB" sz="3700" dirty="0">
+                <a:solidFill>
+                  <a:schemeClr val="bg2">
+                    <a:lumMod val="20000"/>
+                    <a:lumOff val="80000"/>
+                  </a:schemeClr>
+                </a:solidFill>
+              </a:rPr>
+              <a:t>-mean: the average over the region of the B value.</a:t>
+            </a:r>
+            <a:endParaRPr lang="fr-FR" sz="3700" dirty="0">
+              <a:solidFill>
+                <a:schemeClr val="bg2">
+                  <a:lumMod val="20000"/>
+                  <a:lumOff val="80000"/>
+                </a:schemeClr>
+              </a:solidFill>
+            </a:endParaRPr>
+          </a:p>
+          <a:p>
+            <a:r>
+              <a:rPr lang="en-GB" sz="3700" dirty="0" err="1">
+                <a:solidFill>
+                  <a:schemeClr val="bg2">
+                    <a:lumMod val="20000"/>
+                    <a:lumOff val="80000"/>
+                  </a:schemeClr>
+                </a:solidFill>
+              </a:rPr>
+              <a:t>rawgreen</a:t>
+            </a:r>
+            <a:r>
+              <a:rPr lang="en-GB" sz="3700" dirty="0">
+                <a:solidFill>
+                  <a:schemeClr val="bg2">
+                    <a:lumMod val="20000"/>
+                    <a:lumOff val="80000"/>
+                  </a:schemeClr>
+                </a:solidFill>
+              </a:rPr>
+              <a:t>-mean: the average over the region of the G value.</a:t>
+            </a:r>
+            <a:endParaRPr lang="fr-FR" sz="3700" dirty="0">
+              <a:solidFill>
+                <a:schemeClr val="bg2">
+                  <a:lumMod val="20000"/>
+                  <a:lumOff val="80000"/>
+                </a:schemeClr>
+              </a:solidFill>
+            </a:endParaRPr>
+          </a:p>
+          <a:p>
+            <a:r>
+              <a:rPr lang="en-GB" sz="3700" dirty="0" err="1">
+                <a:solidFill>
+                  <a:schemeClr val="bg2">
+                    <a:lumMod val="20000"/>
+                    <a:lumOff val="80000"/>
+                  </a:schemeClr>
+                </a:solidFill>
+              </a:rPr>
+              <a:t>exred</a:t>
+            </a:r>
+            <a:r>
+              <a:rPr lang="en-GB" sz="3700" dirty="0">
+                <a:solidFill>
+                  <a:schemeClr val="bg2">
+                    <a:lumMod val="20000"/>
+                    <a:lumOff val="80000"/>
+                  </a:schemeClr>
+                </a:solidFill>
+              </a:rPr>
+              <a:t>-mean: measure the excess red:  (2R - (G + B))</a:t>
+            </a:r>
+            <a:endParaRPr lang="fr-FR" sz="3700" dirty="0">
+              <a:solidFill>
+                <a:schemeClr val="bg2">
+                  <a:lumMod val="20000"/>
+                  <a:lumOff val="80000"/>
+                </a:schemeClr>
+              </a:solidFill>
+            </a:endParaRPr>
+          </a:p>
+          <a:p>
+            <a:r>
+              <a:rPr lang="en-GB" sz="3700" dirty="0" err="1">
+                <a:solidFill>
+                  <a:schemeClr val="bg2">
+                    <a:lumMod val="20000"/>
+                    <a:lumOff val="80000"/>
+                  </a:schemeClr>
+                </a:solidFill>
+              </a:rPr>
+              <a:t>exblue</a:t>
+            </a:r>
+            <a:r>
+              <a:rPr lang="en-GB" sz="3700" dirty="0">
+                <a:solidFill>
+                  <a:schemeClr val="bg2">
+                    <a:lumMod val="20000"/>
+                    <a:lumOff val="80000"/>
+                  </a:schemeClr>
+                </a:solidFill>
+              </a:rPr>
+              <a:t>-mean: measure the excess blue:  (2B - (G + R))</a:t>
+            </a:r>
+            <a:endParaRPr lang="fr-FR" sz="3700" dirty="0">
+              <a:solidFill>
+                <a:schemeClr val="bg2">
+                  <a:lumMod val="20000"/>
+                  <a:lumOff val="80000"/>
+                </a:schemeClr>
+              </a:solidFill>
+            </a:endParaRPr>
+          </a:p>
+          <a:p>
+            <a:r>
+              <a:rPr lang="en-GB" sz="3700" dirty="0" err="1">
+                <a:solidFill>
+                  <a:schemeClr val="bg2">
+                    <a:lumMod val="20000"/>
+                    <a:lumOff val="80000"/>
+                  </a:schemeClr>
+                </a:solidFill>
+              </a:rPr>
+              <a:t>exgreen</a:t>
+            </a:r>
+            <a:r>
+              <a:rPr lang="en-GB" sz="3700" dirty="0">
+                <a:solidFill>
+                  <a:schemeClr val="bg2">
+                    <a:lumMod val="20000"/>
+                    <a:lumOff val="80000"/>
+                  </a:schemeClr>
+                </a:solidFill>
+              </a:rPr>
+              <a:t>-mean: measure the excess green:  (2G - (R + B))</a:t>
+            </a:r>
+            <a:endParaRPr lang="fr-FR" sz="3700" dirty="0">
+              <a:solidFill>
+                <a:schemeClr val="bg2">
+                  <a:lumMod val="20000"/>
+                  <a:lumOff val="80000"/>
+                </a:schemeClr>
+              </a:solidFill>
+            </a:endParaRPr>
+          </a:p>
+          <a:p>
+            <a:r>
+              <a:rPr lang="en-GB" sz="3700" dirty="0">
+                <a:solidFill>
+                  <a:schemeClr val="bg2">
+                    <a:lumMod val="20000"/>
+                    <a:lumOff val="80000"/>
+                  </a:schemeClr>
+                </a:solidFill>
+              </a:rPr>
+              <a:t>value-mean:  3-d nonlinear transformation of RGB. (Algorithm can be found in Foley and </a:t>
+            </a:r>
+            <a:r>
+              <a:rPr lang="en-GB" sz="3700" dirty="0" err="1">
+                <a:solidFill>
+                  <a:schemeClr val="bg2">
+                    <a:lumMod val="20000"/>
+                    <a:lumOff val="80000"/>
+                  </a:schemeClr>
+                </a:solidFill>
+              </a:rPr>
+              <a:t>VanDam</a:t>
+            </a:r>
+            <a:r>
+              <a:rPr lang="en-GB" sz="3700" dirty="0">
+                <a:solidFill>
+                  <a:schemeClr val="bg2">
+                    <a:lumMod val="20000"/>
+                    <a:lumOff val="80000"/>
+                  </a:schemeClr>
+                </a:solidFill>
+              </a:rPr>
+              <a:t>, Fundamentals of Interactive Computer Graphics)</a:t>
+            </a:r>
+            <a:endParaRPr lang="fr-FR" sz="3700" dirty="0">
+              <a:solidFill>
+                <a:schemeClr val="bg2">
+                  <a:lumMod val="20000"/>
+                  <a:lumOff val="80000"/>
+                </a:schemeClr>
+              </a:solidFill>
+            </a:endParaRPr>
+          </a:p>
+          <a:p>
+            <a:r>
+              <a:rPr lang="en-GB" sz="3700" dirty="0" err="1">
+                <a:solidFill>
+                  <a:schemeClr val="bg2">
+                    <a:lumMod val="20000"/>
+                    <a:lumOff val="80000"/>
+                  </a:schemeClr>
+                </a:solidFill>
+              </a:rPr>
+              <a:t>saturatoin</a:t>
+            </a:r>
+            <a:r>
+              <a:rPr lang="en-GB" sz="3700" dirty="0">
+                <a:solidFill>
+                  <a:schemeClr val="bg2">
+                    <a:lumMod val="20000"/>
+                    <a:lumOff val="80000"/>
+                  </a:schemeClr>
+                </a:solidFill>
+              </a:rPr>
+              <a:t>-mean:  (see 17)</a:t>
+            </a:r>
+            <a:endParaRPr lang="fr-FR" sz="3700" dirty="0">
+              <a:solidFill>
+                <a:schemeClr val="bg2">
+                  <a:lumMod val="20000"/>
+                  <a:lumOff val="80000"/>
+                </a:schemeClr>
+              </a:solidFill>
+            </a:endParaRPr>
+          </a:p>
+          <a:p>
+            <a:r>
+              <a:rPr lang="en-GB" sz="3700" dirty="0">
+                <a:solidFill>
+                  <a:schemeClr val="bg2">
+                    <a:lumMod val="20000"/>
+                    <a:lumOff val="80000"/>
+                  </a:schemeClr>
+                </a:solidFill>
+              </a:rPr>
+              <a:t>hue-mean:  (see 17)</a:t>
+            </a:r>
+            <a:endParaRPr lang="fr-FR" sz="3700" dirty="0">
+              <a:solidFill>
+                <a:schemeClr val="bg2">
+                  <a:lumMod val="20000"/>
+                  <a:lumOff val="80000"/>
+                </a:schemeClr>
+              </a:solidFill>
+            </a:endParaRPr>
+          </a:p>
+          <a:p>
+            <a:endParaRPr lang="fr-FR" dirty="0"/>
+          </a:p>
+        </p:txBody>
+      </p:sp>
+    </p:spTree>
+    <p:extLst>
+      <p:ext uri="{BB962C8B-B14F-4D97-AF65-F5344CB8AC3E}">
+        <p14:creationId xmlns:p14="http://schemas.microsoft.com/office/powerpoint/2010/main" val="339262366"/>
+      </p:ext>
+    </p:extLst>
+  </p:cSld>
+  <p:clrMapOvr>
+    <a:masterClrMapping/>
+  </p:clrMapOvr>
+</p:sld>
+</file>
+
+<file path=ppt/slides/slide4.xml><?xml version="1.0" encoding="utf-8"?>
+<p:sld xmlns:a="http://schemas.openxmlformats.org/drawingml/2006/main" xmlns:r="http://schemas.openxmlformats.org/officeDocument/2006/relationships" xmlns:p="http://schemas.openxmlformats.org/presentationml/2006/main">
+  <p:cSld>
+    <p:spTree>
+      <p:nvGrpSpPr>
+        <p:cNvPr id="1" name=""/>
+        <p:cNvGrpSpPr/>
+        <p:nvPr/>
+      </p:nvGrpSpPr>
+      <p:grpSpPr>
+        <a:xfrm>
+          <a:off x="0" y="0"/>
+          <a:ext cx="0" cy="0"/>
+          <a:chOff x="0" y="0"/>
+          <a:chExt cx="0" cy="0"/>
+        </a:xfrm>
+      </p:grpSpPr>
+      <p:sp>
+        <p:nvSpPr>
+          <p:cNvPr id="2" name="Titre 1">
+            <a:extLst>
+              <a:ext uri="{FF2B5EF4-FFF2-40B4-BE49-F238E27FC236}">
+                <a16:creationId xmlns:a16="http://schemas.microsoft.com/office/drawing/2014/main" id="{152F2687-BDBF-4933-988C-0EEF2F66903B}"/>
+              </a:ext>
+            </a:extLst>
+          </p:cNvPr>
+          <p:cNvSpPr>
+            <a:spLocks noGrp="1"/>
+          </p:cNvSpPr>
+          <p:nvPr>
+            <p:ph type="title"/>
+          </p:nvPr>
+        </p:nvSpPr>
+        <p:spPr>
+          <a:xfrm>
+            <a:off x="684212" y="685800"/>
+            <a:ext cx="8534400" cy="1507067"/>
+          </a:xfrm>
+        </p:spPr>
+        <p:txBody>
+          <a:bodyPr/>
+          <a:lstStyle/>
+          <a:p>
+            <a:r>
+              <a:rPr lang="fr-FR" dirty="0"/>
+              <a:t>Data engineering</a:t>
+            </a:r>
+          </a:p>
+        </p:txBody>
+      </p:sp>
+      <p:sp>
+        <p:nvSpPr>
+          <p:cNvPr id="3" name="Espace réservé du contenu 2">
+            <a:extLst>
+              <a:ext uri="{FF2B5EF4-FFF2-40B4-BE49-F238E27FC236}">
+                <a16:creationId xmlns:a16="http://schemas.microsoft.com/office/drawing/2014/main" id="{082076C8-BB0B-4194-BE46-20BDCC129AFA}"/>
+              </a:ext>
+            </a:extLst>
+          </p:cNvPr>
+          <p:cNvSpPr>
+            <a:spLocks noGrp="1"/>
+          </p:cNvSpPr>
+          <p:nvPr>
+            <p:ph idx="1"/>
+          </p:nvPr>
+        </p:nvSpPr>
+        <p:spPr>
+          <a:xfrm>
+            <a:off x="684212" y="1891026"/>
+            <a:ext cx="10155424" cy="4527529"/>
+          </a:xfrm>
+        </p:spPr>
+        <p:txBody>
+          <a:bodyPr/>
+          <a:lstStyle/>
+          <a:p>
+            <a:pPr marL="0" indent="0">
+              <a:buNone/>
+            </a:pPr>
+            <a:r>
+              <a:rPr lang="fr-FR" dirty="0">
+                <a:solidFill>
+                  <a:schemeClr val="bg2">
+                    <a:lumMod val="20000"/>
+                    <a:lumOff val="80000"/>
+                  </a:schemeClr>
+                </a:solidFill>
+              </a:rPr>
+              <a:t>Les étapes :</a:t>
+            </a:r>
+          </a:p>
+          <a:p>
+            <a:pPr lvl="1"/>
+            <a:r>
+              <a:rPr lang="fr-FR" dirty="0">
+                <a:solidFill>
+                  <a:schemeClr val="bg2">
+                    <a:lumMod val="20000"/>
+                    <a:lumOff val="80000"/>
+                  </a:schemeClr>
+                </a:solidFill>
+              </a:rPr>
+              <a:t>Créer la table pandas</a:t>
+            </a:r>
+          </a:p>
+          <a:p>
+            <a:pPr lvl="1"/>
+            <a:r>
+              <a:rPr lang="fr-FR" dirty="0">
+                <a:solidFill>
+                  <a:schemeClr val="bg2">
+                    <a:lumMod val="20000"/>
+                    <a:lumOff val="80000"/>
+                  </a:schemeClr>
+                </a:solidFill>
+              </a:rPr>
+              <a:t>Le label n’est pas une colonne dans le fichier csv, il se transforme en indexe dans la table. J’ai donc rajouté un nouvelle colonne puis </a:t>
+            </a:r>
+            <a:r>
+              <a:rPr lang="fr-FR" dirty="0" err="1">
+                <a:solidFill>
+                  <a:schemeClr val="bg2">
+                    <a:lumMod val="20000"/>
+                    <a:lumOff val="80000"/>
+                  </a:schemeClr>
+                </a:solidFill>
+              </a:rPr>
+              <a:t>reindexé</a:t>
+            </a:r>
+            <a:r>
+              <a:rPr lang="fr-FR" dirty="0">
+                <a:solidFill>
+                  <a:schemeClr val="bg2">
+                    <a:lumMod val="20000"/>
+                    <a:lumOff val="80000"/>
+                  </a:schemeClr>
+                </a:solidFill>
+              </a:rPr>
+              <a:t> le tableau</a:t>
+            </a:r>
+          </a:p>
+          <a:p>
+            <a:pPr lvl="1"/>
+            <a:r>
+              <a:rPr lang="fr-FR" dirty="0">
+                <a:solidFill>
+                  <a:schemeClr val="bg2">
+                    <a:lumMod val="20000"/>
+                    <a:lumOff val="80000"/>
+                  </a:schemeClr>
+                </a:solidFill>
+              </a:rPr>
+              <a:t>Il n’y a pas de valeurs manquantes</a:t>
+            </a:r>
+          </a:p>
+          <a:p>
+            <a:pPr lvl="1"/>
+            <a:r>
+              <a:rPr lang="fr-FR" dirty="0">
+                <a:solidFill>
+                  <a:schemeClr val="bg2">
+                    <a:lumMod val="20000"/>
+                    <a:lumOff val="80000"/>
+                  </a:schemeClr>
+                </a:solidFill>
+              </a:rPr>
+              <a:t>Le nombre de ligne par label est similaire (300)</a:t>
+            </a:r>
+          </a:p>
+          <a:p>
+            <a:pPr lvl="1"/>
+            <a:r>
+              <a:rPr lang="fr-FR" dirty="0">
+                <a:solidFill>
+                  <a:schemeClr val="bg2">
+                    <a:lumMod val="20000"/>
+                    <a:lumOff val="80000"/>
+                  </a:schemeClr>
+                </a:solidFill>
+              </a:rPr>
+              <a:t>Toutes les valeurs sont numériques (pas de modifications intéressantes)</a:t>
+            </a:r>
+          </a:p>
+          <a:p>
+            <a:pPr lvl="1"/>
+            <a:r>
+              <a:rPr lang="fr-FR" dirty="0">
+                <a:solidFill>
+                  <a:schemeClr val="bg2">
+                    <a:lumMod val="20000"/>
+                    <a:lumOff val="80000"/>
+                  </a:schemeClr>
+                </a:solidFill>
+              </a:rPr>
+              <a:t>J’ai ensuite étudié les valeurs distinctes, la colonne « REGION-PIXEL-COUNT » ne contient qu’une valeur, j’ai donc supprimé la colonne car elle n’apporte pas d’information</a:t>
+            </a:r>
+          </a:p>
+          <a:p>
+            <a:pPr lvl="1"/>
+            <a:r>
+              <a:rPr lang="fr-FR" dirty="0">
+                <a:solidFill>
+                  <a:schemeClr val="bg2">
+                    <a:lumMod val="20000"/>
+                    <a:lumOff val="80000"/>
+                  </a:schemeClr>
+                </a:solidFill>
+              </a:rPr>
+              <a:t>J’ai factorisé la colonne Label pour la transformer en numérique (valeurs : 0 à 6)</a:t>
+            </a:r>
+          </a:p>
+        </p:txBody>
+      </p:sp>
+    </p:spTree>
+    <p:extLst>
+      <p:ext uri="{BB962C8B-B14F-4D97-AF65-F5344CB8AC3E}">
+        <p14:creationId xmlns:p14="http://schemas.microsoft.com/office/powerpoint/2010/main" val="3313268773"/>
+      </p:ext>
+    </p:extLst>
+  </p:cSld>
+  <p:clrMapOvr>
+    <a:masterClrMapping/>
+  </p:clrMapOvr>
+</p:sld>
+</file>
+
+<file path=ppt/slides/slide5.xml><?xml version="1.0" encoding="utf-8"?>
+<p:sld xmlns:a="http://schemas.openxmlformats.org/drawingml/2006/main" xmlns:r="http://schemas.openxmlformats.org/officeDocument/2006/relationships" xmlns:p="http://schemas.openxmlformats.org/presentationml/2006/main">
+  <p:cSld>
+    <p:spTree>
+      <p:nvGrpSpPr>
+        <p:cNvPr id="1" name=""/>
+        <p:cNvGrpSpPr/>
+        <p:nvPr/>
+      </p:nvGrpSpPr>
+      <p:grpSpPr>
+        <a:xfrm>
+          <a:off x="0" y="0"/>
+          <a:ext cx="0" cy="0"/>
+          <a:chOff x="0" y="0"/>
+          <a:chExt cx="0" cy="0"/>
+        </a:xfrm>
+      </p:grpSpPr>
+      <p:sp>
+        <p:nvSpPr>
+          <p:cNvPr id="2" name="Titre 1">
+            <a:extLst>
+              <a:ext uri="{FF2B5EF4-FFF2-40B4-BE49-F238E27FC236}">
+                <a16:creationId xmlns:a16="http://schemas.microsoft.com/office/drawing/2014/main" id="{152F2687-BDBF-4933-988C-0EEF2F66903B}"/>
+              </a:ext>
+            </a:extLst>
+          </p:cNvPr>
+          <p:cNvSpPr>
+            <a:spLocks noGrp="1"/>
+          </p:cNvSpPr>
+          <p:nvPr>
+            <p:ph type="title"/>
+          </p:nvPr>
+        </p:nvSpPr>
+        <p:spPr>
+          <a:xfrm>
+            <a:off x="684212" y="685800"/>
+            <a:ext cx="8534400" cy="1507067"/>
+          </a:xfrm>
+        </p:spPr>
+        <p:txBody>
+          <a:bodyPr/>
+          <a:lstStyle/>
+          <a:p>
+            <a:r>
+              <a:rPr lang="fr-FR" dirty="0"/>
+              <a:t>Visualisation</a:t>
+            </a:r>
+          </a:p>
+        </p:txBody>
+      </p:sp>
+      <p:sp>
+        <p:nvSpPr>
+          <p:cNvPr id="3" name="Espace réservé du contenu 2">
+            <a:extLst>
+              <a:ext uri="{FF2B5EF4-FFF2-40B4-BE49-F238E27FC236}">
+                <a16:creationId xmlns:a16="http://schemas.microsoft.com/office/drawing/2014/main" id="{082076C8-BB0B-4194-BE46-20BDCC129AFA}"/>
+              </a:ext>
+            </a:extLst>
+          </p:cNvPr>
+          <p:cNvSpPr>
+            <a:spLocks noGrp="1"/>
+          </p:cNvSpPr>
+          <p:nvPr>
+            <p:ph idx="1"/>
+          </p:nvPr>
+        </p:nvSpPr>
+        <p:spPr>
+          <a:xfrm>
+            <a:off x="684212" y="1891027"/>
+            <a:ext cx="10155424" cy="2618830"/>
+          </a:xfrm>
+        </p:spPr>
+        <p:txBody>
+          <a:bodyPr/>
+          <a:lstStyle/>
+          <a:p>
+            <a:pPr marL="0" indent="0">
+              <a:buNone/>
+            </a:pPr>
+            <a:r>
+              <a:rPr lang="fr-FR" dirty="0">
+                <a:solidFill>
+                  <a:schemeClr val="bg2">
+                    <a:lumMod val="20000"/>
+                    <a:lumOff val="80000"/>
+                  </a:schemeClr>
+                </a:solidFill>
+              </a:rPr>
+              <a:t>Seule visualisation faite est un ensemble de </a:t>
+            </a:r>
+            <a:r>
+              <a:rPr lang="fr-FR" dirty="0" err="1">
+                <a:solidFill>
+                  <a:schemeClr val="bg2">
+                    <a:lumMod val="20000"/>
+                    <a:lumOff val="80000"/>
+                  </a:schemeClr>
+                </a:solidFill>
+              </a:rPr>
+              <a:t>boxplots</a:t>
+            </a:r>
+            <a:r>
+              <a:rPr lang="fr-FR" dirty="0">
+                <a:solidFill>
+                  <a:schemeClr val="bg2">
+                    <a:lumMod val="20000"/>
+                    <a:lumOff val="80000"/>
+                  </a:schemeClr>
+                </a:solidFill>
+              </a:rPr>
+              <a:t> pour chaque label et pour une colonne sélectionnée :</a:t>
+            </a:r>
+          </a:p>
+          <a:p>
+            <a:pPr marL="0" indent="0">
+              <a:buNone/>
+            </a:pPr>
+            <a:endParaRPr lang="fr-FR" dirty="0">
+              <a:solidFill>
+                <a:schemeClr val="bg2">
+                  <a:lumMod val="20000"/>
+                  <a:lumOff val="80000"/>
+                </a:schemeClr>
+              </a:solidFill>
+            </a:endParaRPr>
+          </a:p>
+        </p:txBody>
+      </p:sp>
+      <p:pic>
+        <p:nvPicPr>
+          <p:cNvPr id="5" name="Image 4">
+            <a:extLst>
+              <a:ext uri="{FF2B5EF4-FFF2-40B4-BE49-F238E27FC236}">
+                <a16:creationId xmlns:a16="http://schemas.microsoft.com/office/drawing/2014/main" id="{A8ED67B2-A605-4DF2-837B-DD6078EA58A4}"/>
+              </a:ext>
+            </a:extLst>
+          </p:cNvPr>
+          <p:cNvPicPr>
+            <a:picLocks noChangeAspect="1"/>
+          </p:cNvPicPr>
+          <p:nvPr/>
+        </p:nvPicPr>
+        <p:blipFill>
+          <a:blip r:embed="rId2"/>
+          <a:stretch>
+            <a:fillRect/>
+          </a:stretch>
+        </p:blipFill>
+        <p:spPr>
+          <a:xfrm>
+            <a:off x="394586" y="3571959"/>
+            <a:ext cx="10734675" cy="2143125"/>
+          </a:xfrm>
+          <a:prstGeom prst="rect">
+            <a:avLst/>
+          </a:prstGeom>
+        </p:spPr>
+      </p:pic>
+    </p:spTree>
+    <p:extLst>
+      <p:ext uri="{BB962C8B-B14F-4D97-AF65-F5344CB8AC3E}">
+        <p14:creationId xmlns:p14="http://schemas.microsoft.com/office/powerpoint/2010/main" val="2758567474"/>
+      </p:ext>
+    </p:extLst>
+  </p:cSld>
+  <p:clrMapOvr>
+    <a:masterClrMapping/>
+  </p:clrMapOvr>
+</p:sld>
+</file>
+
+<file path=ppt/slides/slide6.xml><?xml version="1.0" encoding="utf-8"?>
+<p:sld xmlns:a="http://schemas.openxmlformats.org/drawingml/2006/main" xmlns:r="http://schemas.openxmlformats.org/officeDocument/2006/relationships" xmlns:p="http://schemas.openxmlformats.org/presentationml/2006/main">
+  <p:cSld>
+    <p:spTree>
+      <p:nvGrpSpPr>
+        <p:cNvPr id="1" name=""/>
+        <p:cNvGrpSpPr/>
+        <p:nvPr/>
+      </p:nvGrpSpPr>
+      <p:grpSpPr>
+        <a:xfrm>
+          <a:off x="0" y="0"/>
+          <a:ext cx="0" cy="0"/>
+          <a:chOff x="0" y="0"/>
+          <a:chExt cx="0" cy="0"/>
+        </a:xfrm>
+      </p:grpSpPr>
+      <p:sp>
+        <p:nvSpPr>
+          <p:cNvPr id="2" name="Titre 1">
+            <a:extLst>
+              <a:ext uri="{FF2B5EF4-FFF2-40B4-BE49-F238E27FC236}">
+                <a16:creationId xmlns:a16="http://schemas.microsoft.com/office/drawing/2014/main" id="{152F2687-BDBF-4933-988C-0EEF2F66903B}"/>
+              </a:ext>
+            </a:extLst>
+          </p:cNvPr>
+          <p:cNvSpPr>
+            <a:spLocks noGrp="1"/>
+          </p:cNvSpPr>
+          <p:nvPr>
+            <p:ph type="title"/>
+          </p:nvPr>
+        </p:nvSpPr>
+        <p:spPr>
+          <a:xfrm>
+            <a:off x="684212" y="685800"/>
+            <a:ext cx="8534400" cy="1507067"/>
+          </a:xfrm>
+        </p:spPr>
+        <p:txBody>
+          <a:bodyPr/>
+          <a:lstStyle/>
+          <a:p>
+            <a:r>
+              <a:rPr lang="fr-FR" dirty="0"/>
+              <a:t>Modélisation et OPTIMISATION</a:t>
+            </a:r>
+          </a:p>
+        </p:txBody>
+      </p:sp>
+      <p:sp>
+        <p:nvSpPr>
+          <p:cNvPr id="3" name="Espace réservé du contenu 2">
+            <a:extLst>
+              <a:ext uri="{FF2B5EF4-FFF2-40B4-BE49-F238E27FC236}">
+                <a16:creationId xmlns:a16="http://schemas.microsoft.com/office/drawing/2014/main" id="{082076C8-BB0B-4194-BE46-20BDCC129AFA}"/>
+              </a:ext>
+            </a:extLst>
+          </p:cNvPr>
+          <p:cNvSpPr>
+            <a:spLocks noGrp="1"/>
+          </p:cNvSpPr>
+          <p:nvPr>
+            <p:ph idx="1"/>
+          </p:nvPr>
+        </p:nvSpPr>
+        <p:spPr>
+          <a:xfrm>
+            <a:off x="400742" y="1439333"/>
+            <a:ext cx="10155424" cy="3864198"/>
+          </a:xfrm>
+        </p:spPr>
+        <p:txBody>
+          <a:bodyPr/>
+          <a:lstStyle/>
+          <a:p>
+            <a:pPr lvl="1"/>
+            <a:r>
+              <a:rPr lang="fr-FR" dirty="0">
+                <a:solidFill>
+                  <a:schemeClr val="bg2">
+                    <a:lumMod val="20000"/>
+                    <a:lumOff val="80000"/>
+                  </a:schemeClr>
+                </a:solidFill>
+              </a:rPr>
+              <a:t>Différents modèles testés : Ridge, </a:t>
+            </a:r>
+            <a:r>
+              <a:rPr lang="fr-FR" dirty="0" err="1">
+                <a:solidFill>
+                  <a:schemeClr val="bg2">
+                    <a:lumMod val="20000"/>
+                    <a:lumOff val="80000"/>
+                  </a:schemeClr>
+                </a:solidFill>
+              </a:rPr>
+              <a:t>ElasticNet</a:t>
+            </a:r>
+            <a:r>
+              <a:rPr lang="fr-FR" dirty="0">
+                <a:solidFill>
+                  <a:schemeClr val="bg2">
+                    <a:lumMod val="20000"/>
+                    <a:lumOff val="80000"/>
+                  </a:schemeClr>
+                </a:solidFill>
+              </a:rPr>
+              <a:t>, lasso, SVM, </a:t>
+            </a:r>
+            <a:r>
+              <a:rPr lang="fr-FR" dirty="0" err="1">
+                <a:solidFill>
+                  <a:schemeClr val="bg2">
+                    <a:lumMod val="20000"/>
+                    <a:lumOff val="80000"/>
+                  </a:schemeClr>
+                </a:solidFill>
+              </a:rPr>
+              <a:t>LinearSVC+OnevsRest</a:t>
+            </a:r>
+            <a:endParaRPr lang="fr-FR" dirty="0">
+              <a:solidFill>
+                <a:schemeClr val="bg2">
+                  <a:lumMod val="20000"/>
+                  <a:lumOff val="80000"/>
+                </a:schemeClr>
+              </a:solidFill>
+            </a:endParaRPr>
+          </a:p>
+          <a:p>
+            <a:pPr lvl="1"/>
+            <a:endParaRPr lang="fr-FR" dirty="0">
+              <a:solidFill>
+                <a:schemeClr val="bg2">
+                  <a:lumMod val="20000"/>
+                  <a:lumOff val="80000"/>
+                </a:schemeClr>
+              </a:solidFill>
+            </a:endParaRPr>
+          </a:p>
+          <a:p>
+            <a:pPr marL="457200" lvl="1" indent="0">
+              <a:buNone/>
+            </a:pPr>
+            <a:endParaRPr lang="fr-FR" dirty="0">
+              <a:solidFill>
+                <a:schemeClr val="bg2">
+                  <a:lumMod val="20000"/>
+                  <a:lumOff val="80000"/>
+                </a:schemeClr>
+              </a:solidFill>
+            </a:endParaRPr>
+          </a:p>
+          <a:p>
+            <a:pPr marL="457200" lvl="1" indent="0">
+              <a:buNone/>
+            </a:pPr>
+            <a:endParaRPr lang="fr-FR" dirty="0">
+              <a:solidFill>
+                <a:schemeClr val="bg2">
+                  <a:lumMod val="20000"/>
+                  <a:lumOff val="80000"/>
+                </a:schemeClr>
+              </a:solidFill>
+            </a:endParaRPr>
+          </a:p>
+          <a:p>
+            <a:pPr marL="457200" lvl="1" indent="0">
+              <a:buNone/>
+            </a:pPr>
+            <a:endParaRPr lang="fr-FR" dirty="0">
+              <a:solidFill>
+                <a:schemeClr val="bg2">
+                  <a:lumMod val="20000"/>
+                  <a:lumOff val="80000"/>
+                </a:schemeClr>
+              </a:solidFill>
+            </a:endParaRPr>
+          </a:p>
+          <a:p>
+            <a:pPr lvl="1"/>
+            <a:r>
+              <a:rPr lang="fr-FR" dirty="0">
+                <a:solidFill>
+                  <a:schemeClr val="bg2">
+                    <a:lumMod val="20000"/>
+                    <a:lumOff val="80000"/>
+                  </a:schemeClr>
+                </a:solidFill>
+              </a:rPr>
+              <a:t>Optimisation : </a:t>
+            </a:r>
+            <a:r>
+              <a:rPr lang="fr-FR" dirty="0" err="1">
+                <a:solidFill>
+                  <a:schemeClr val="bg2">
+                    <a:lumMod val="20000"/>
+                    <a:lumOff val="80000"/>
+                  </a:schemeClr>
+                </a:solidFill>
+              </a:rPr>
+              <a:t>GridSearch</a:t>
+            </a:r>
+            <a:r>
+              <a:rPr lang="fr-FR" dirty="0">
+                <a:solidFill>
+                  <a:schemeClr val="bg2">
+                    <a:lumMod val="20000"/>
+                    <a:lumOff val="80000"/>
+                  </a:schemeClr>
+                </a:solidFill>
+              </a:rPr>
+              <a:t> + Cross validation pour éviter l’</a:t>
+            </a:r>
+            <a:r>
+              <a:rPr lang="fr-FR" dirty="0" err="1">
+                <a:solidFill>
+                  <a:schemeClr val="bg2">
+                    <a:lumMod val="20000"/>
+                    <a:lumOff val="80000"/>
+                  </a:schemeClr>
+                </a:solidFill>
+              </a:rPr>
+              <a:t>overfitting</a:t>
+            </a:r>
+            <a:r>
+              <a:rPr lang="fr-FR" dirty="0">
+                <a:solidFill>
+                  <a:schemeClr val="bg2">
+                    <a:lumMod val="20000"/>
+                    <a:lumOff val="80000"/>
+                  </a:schemeClr>
+                </a:solidFill>
+              </a:rPr>
+              <a:t> :</a:t>
+            </a:r>
+          </a:p>
+          <a:p>
+            <a:pPr lvl="1"/>
+            <a:endParaRPr lang="fr-FR" dirty="0">
+              <a:solidFill>
+                <a:schemeClr val="bg2">
+                  <a:lumMod val="20000"/>
+                  <a:lumOff val="80000"/>
+                </a:schemeClr>
+              </a:solidFill>
+            </a:endParaRPr>
+          </a:p>
+        </p:txBody>
+      </p:sp>
+      <p:pic>
+        <p:nvPicPr>
+          <p:cNvPr id="4" name="Image 3">
+            <a:extLst>
+              <a:ext uri="{FF2B5EF4-FFF2-40B4-BE49-F238E27FC236}">
+                <a16:creationId xmlns:a16="http://schemas.microsoft.com/office/drawing/2014/main" id="{4F92EFD1-0685-450E-A381-BAE596220677}"/>
+              </a:ext>
+            </a:extLst>
+          </p:cNvPr>
+          <p:cNvPicPr>
+            <a:picLocks noChangeAspect="1"/>
+          </p:cNvPicPr>
+          <p:nvPr/>
+        </p:nvPicPr>
+        <p:blipFill>
+          <a:blip r:embed="rId2"/>
+          <a:stretch>
+            <a:fillRect/>
+          </a:stretch>
+        </p:blipFill>
+        <p:spPr>
+          <a:xfrm>
+            <a:off x="0" y="4665134"/>
+            <a:ext cx="5379063" cy="530560"/>
+          </a:xfrm>
+          <a:prstGeom prst="rect">
+            <a:avLst/>
+          </a:prstGeom>
+        </p:spPr>
+      </p:pic>
+      <p:pic>
+        <p:nvPicPr>
+          <p:cNvPr id="5" name="Image 4">
+            <a:extLst>
+              <a:ext uri="{FF2B5EF4-FFF2-40B4-BE49-F238E27FC236}">
+                <a16:creationId xmlns:a16="http://schemas.microsoft.com/office/drawing/2014/main" id="{10586801-EC7D-4DE7-B0E4-E80A4D32C30B}"/>
+              </a:ext>
+            </a:extLst>
+          </p:cNvPr>
+          <p:cNvPicPr>
+            <a:picLocks noChangeAspect="1"/>
+          </p:cNvPicPr>
+          <p:nvPr/>
+        </p:nvPicPr>
+        <p:blipFill>
+          <a:blip r:embed="rId3"/>
+          <a:stretch>
+            <a:fillRect/>
+          </a:stretch>
+        </p:blipFill>
+        <p:spPr>
+          <a:xfrm>
+            <a:off x="1211254" y="2362983"/>
+            <a:ext cx="4267200" cy="1609725"/>
+          </a:xfrm>
+          <a:prstGeom prst="rect">
+            <a:avLst/>
+          </a:prstGeom>
+        </p:spPr>
+      </p:pic>
+      <p:pic>
+        <p:nvPicPr>
+          <p:cNvPr id="6" name="Image 5">
+            <a:extLst>
+              <a:ext uri="{FF2B5EF4-FFF2-40B4-BE49-F238E27FC236}">
+                <a16:creationId xmlns:a16="http://schemas.microsoft.com/office/drawing/2014/main" id="{6A0FCEF2-F577-469B-BE0A-108F62ABC5FD}"/>
+              </a:ext>
+            </a:extLst>
+          </p:cNvPr>
+          <p:cNvPicPr>
+            <a:picLocks noChangeAspect="1"/>
+          </p:cNvPicPr>
+          <p:nvPr/>
+        </p:nvPicPr>
+        <p:blipFill>
+          <a:blip r:embed="rId4"/>
+          <a:stretch>
+            <a:fillRect/>
+          </a:stretch>
+        </p:blipFill>
+        <p:spPr>
+          <a:xfrm>
+            <a:off x="5588398" y="4312850"/>
+            <a:ext cx="6332205" cy="2469891"/>
+          </a:xfrm>
+          <a:prstGeom prst="rect">
+            <a:avLst/>
+          </a:prstGeom>
+        </p:spPr>
+      </p:pic>
+    </p:spTree>
+    <p:extLst>
+      <p:ext uri="{BB962C8B-B14F-4D97-AF65-F5344CB8AC3E}">
+        <p14:creationId xmlns:p14="http://schemas.microsoft.com/office/powerpoint/2010/main" val="2681676750"/>
+      </p:ext>
+    </p:extLst>
+  </p:cSld>
+  <p:clrMapOvr>
+    <a:masterClrMapping/>
+  </p:clrMapOvr>
+</p:sld>
+</file>
+
+<file path=ppt/slides/slide7.xml><?xml version="1.0" encoding="utf-8"?>
+<p:sld xmlns:a="http://schemas.openxmlformats.org/drawingml/2006/main" xmlns:r="http://schemas.openxmlformats.org/officeDocument/2006/relationships" xmlns:p="http://schemas.openxmlformats.org/presentationml/2006/main">
+  <p:cSld>
+    <p:spTree>
+      <p:nvGrpSpPr>
+        <p:cNvPr id="1" name=""/>
+        <p:cNvGrpSpPr/>
+        <p:nvPr/>
+      </p:nvGrpSpPr>
+      <p:grpSpPr>
+        <a:xfrm>
+          <a:off x="0" y="0"/>
+          <a:ext cx="0" cy="0"/>
+          <a:chOff x="0" y="0"/>
+          <a:chExt cx="0" cy="0"/>
+        </a:xfrm>
+      </p:grpSpPr>
+      <p:sp>
+        <p:nvSpPr>
+          <p:cNvPr id="2" name="Titre 1">
+            <a:extLst>
+              <a:ext uri="{FF2B5EF4-FFF2-40B4-BE49-F238E27FC236}">
+                <a16:creationId xmlns:a16="http://schemas.microsoft.com/office/drawing/2014/main" id="{152F2687-BDBF-4933-988C-0EEF2F66903B}"/>
+              </a:ext>
+            </a:extLst>
+          </p:cNvPr>
+          <p:cNvSpPr>
+            <a:spLocks noGrp="1"/>
+          </p:cNvSpPr>
+          <p:nvPr>
+            <p:ph type="title"/>
+          </p:nvPr>
+        </p:nvSpPr>
+        <p:spPr>
+          <a:xfrm>
+            <a:off x="684212" y="685800"/>
+            <a:ext cx="8534400" cy="1507067"/>
+          </a:xfrm>
+        </p:spPr>
+        <p:txBody>
+          <a:bodyPr/>
+          <a:lstStyle/>
+          <a:p>
+            <a:r>
+              <a:rPr lang="fr-FR" dirty="0"/>
+              <a:t>Affichage performance</a:t>
+            </a:r>
+          </a:p>
+        </p:txBody>
+      </p:sp>
+      <p:sp>
+        <p:nvSpPr>
+          <p:cNvPr id="3" name="Espace réservé du contenu 2">
+            <a:extLst>
+              <a:ext uri="{FF2B5EF4-FFF2-40B4-BE49-F238E27FC236}">
+                <a16:creationId xmlns:a16="http://schemas.microsoft.com/office/drawing/2014/main" id="{082076C8-BB0B-4194-BE46-20BDCC129AFA}"/>
+              </a:ext>
+            </a:extLst>
+          </p:cNvPr>
+          <p:cNvSpPr>
+            <a:spLocks noGrp="1"/>
+          </p:cNvSpPr>
+          <p:nvPr>
+            <p:ph idx="1"/>
+          </p:nvPr>
+        </p:nvSpPr>
+        <p:spPr>
+          <a:xfrm>
+            <a:off x="684211" y="1376122"/>
+            <a:ext cx="10155424" cy="2618830"/>
+          </a:xfrm>
+        </p:spPr>
+        <p:txBody>
+          <a:bodyPr/>
+          <a:lstStyle/>
+          <a:p>
+            <a:pPr marL="0" indent="0">
+              <a:buNone/>
+            </a:pPr>
+            <a:r>
+              <a:rPr lang="fr-FR" dirty="0">
+                <a:solidFill>
+                  <a:schemeClr val="bg2">
+                    <a:lumMod val="20000"/>
+                    <a:lumOff val="80000"/>
+                  </a:schemeClr>
+                </a:solidFill>
+              </a:rPr>
+              <a:t>J’ai dû utiliser un autre modèle moins performant et j’ai affiché les courbes ROC </a:t>
+            </a:r>
+            <a:r>
+              <a:rPr lang="fr-FR">
+                <a:solidFill>
+                  <a:schemeClr val="bg2">
+                    <a:lumMod val="20000"/>
+                    <a:lumOff val="80000"/>
+                  </a:schemeClr>
+                </a:solidFill>
+              </a:rPr>
+              <a:t>pour chaque LABEL</a:t>
+            </a:r>
+            <a:endParaRPr lang="fr-FR" dirty="0">
+              <a:solidFill>
+                <a:schemeClr val="bg2">
+                  <a:lumMod val="20000"/>
+                  <a:lumOff val="80000"/>
+                </a:schemeClr>
+              </a:solidFill>
+            </a:endParaRPr>
+          </a:p>
+          <a:p>
+            <a:pPr marL="0" indent="0">
+              <a:buNone/>
+            </a:pPr>
+            <a:endParaRPr lang="fr-FR" dirty="0">
+              <a:solidFill>
+                <a:schemeClr val="bg2">
+                  <a:lumMod val="20000"/>
+                  <a:lumOff val="80000"/>
+                </a:schemeClr>
+              </a:solidFill>
+            </a:endParaRPr>
+          </a:p>
+        </p:txBody>
+      </p:sp>
+      <p:pic>
+        <p:nvPicPr>
+          <p:cNvPr id="4" name="Image 3">
+            <a:extLst>
+              <a:ext uri="{FF2B5EF4-FFF2-40B4-BE49-F238E27FC236}">
+                <a16:creationId xmlns:a16="http://schemas.microsoft.com/office/drawing/2014/main" id="{8C224CDA-FA72-4952-9A53-CC4E4C9F8F8F}"/>
+              </a:ext>
+            </a:extLst>
+          </p:cNvPr>
+          <p:cNvPicPr>
+            <a:picLocks noChangeAspect="1"/>
+          </p:cNvPicPr>
+          <p:nvPr/>
+        </p:nvPicPr>
+        <p:blipFill>
+          <a:blip r:embed="rId2"/>
+          <a:stretch>
+            <a:fillRect/>
+          </a:stretch>
+        </p:blipFill>
+        <p:spPr>
+          <a:xfrm>
+            <a:off x="1771650" y="3305175"/>
+            <a:ext cx="4324350" cy="3552825"/>
+          </a:xfrm>
+          <a:prstGeom prst="rect">
+            <a:avLst/>
+          </a:prstGeom>
+        </p:spPr>
+      </p:pic>
+    </p:spTree>
+    <p:extLst>
+      <p:ext uri="{BB962C8B-B14F-4D97-AF65-F5344CB8AC3E}">
+        <p14:creationId xmlns:p14="http://schemas.microsoft.com/office/powerpoint/2010/main" val="1825242491"/>
       </p:ext>
     </p:extLst>
   </p:cSld>

</xml_diff>